<commit_message>
Stiver : Arrays, FiniteAutomata Revision, Lessons, Greedy
</commit_message>
<xml_diff>
--- a/DSA/Stiver DSA/3. Solve problems on Arrays/Easy.pptx
+++ b/DSA/Stiver DSA/3. Solve problems on Arrays/Easy.pptx
@@ -11,17 +11,6 @@
     <p:sldId id="259" r:id="rId5"/>
     <p:sldId id="260" r:id="rId6"/>
     <p:sldId id="261" r:id="rId7"/>
-    <p:sldId id="262" r:id="rId8"/>
-    <p:sldId id="263" r:id="rId9"/>
-    <p:sldId id="264" r:id="rId10"/>
-    <p:sldId id="265" r:id="rId11"/>
-    <p:sldId id="266" r:id="rId12"/>
-    <p:sldId id="267" r:id="rId13"/>
-    <p:sldId id="268" r:id="rId14"/>
-    <p:sldId id="269" r:id="rId15"/>
-    <p:sldId id="270" r:id="rId16"/>
-    <p:sldId id="271" r:id="rId17"/>
-    <p:sldId id="272" r:id="rId18"/>
   </p:sldIdLst>
   <p:sldSz cx="12192000" cy="6858000"/>
   <p:notesSz cx="6858000" cy="9144000"/>
@@ -120,6 +109,45 @@
       </a:defRPr>
     </a:lvl9pPr>
   </p:defaultTextStyle>
+  <p:extLst>
+    <p:ext uri="{521415D9-36F7-43E2-AB2F-B90AF26B5E84}">
+      <p14:sectionLst xmlns:p14="http://schemas.microsoft.com/office/powerpoint/2010/main">
+        <p14:section name="Default Section" id="{9C9BA07B-AF79-4347-8BDE-D6A361F9768A}">
+          <p14:sldIdLst>
+            <p14:sldId id="256"/>
+          </p14:sldIdLst>
+        </p14:section>
+        <p14:section name="GFG : Largest Element in Array" id="{6AB88D8A-D951-4765-9CF6-DEAF75CE367B}">
+          <p14:sldIdLst>
+            <p14:sldId id="257"/>
+          </p14:sldIdLst>
+        </p14:section>
+        <p14:section name="LCM 215 : Kth Largest Element in an Array" id="{38BFE53C-0501-4E99-9AED-6E529674D6C1}">
+          <p14:sldIdLst>
+            <p14:sldId id="258"/>
+          </p14:sldIdLst>
+        </p14:section>
+        <p14:section name="GFG : Remove Duplicates Sorted Array" id="{B261FCD2-51BF-4E90-A8E2-C9B331DA5032}">
+          <p14:sldIdLst>
+            <p14:sldId id="259"/>
+          </p14:sldIdLst>
+        </p14:section>
+        <p14:section name="GFG : Second Largest" id="{2A4C6A34-BDA8-4EEB-99A3-23CC231BA899}">
+          <p14:sldIdLst>
+            <p14:sldId id="260"/>
+          </p14:sldIdLst>
+        </p14:section>
+        <p14:section name="LCE 26 : Remove Duplicates from Sorted Array" id="{8CDB8BA4-9680-4293-A403-09091F08F4AC}">
+          <p14:sldIdLst>
+            <p14:sldId id="261"/>
+          </p14:sldIdLst>
+        </p14:section>
+      </p14:sectionLst>
+    </p:ext>
+    <p:ext uri="{EFAFB233-063F-42B5-8137-9DF3F51BA10A}">
+      <p15:sldGuideLst xmlns:p15="http://schemas.microsoft.com/office/powerpoint/2012/main"/>
+    </p:ext>
+  </p:extLst>
 </p:presentation>
 </file>
 
@@ -3379,32 +3407,14 @@
           <a:bodyPr/>
           <a:lstStyle/>
           <a:p>
-            <a:endParaRPr lang="en-IN"/>
-          </a:p>
-        </p:txBody>
-      </p:sp>
-      <p:sp>
-        <p:nvSpPr>
-          <p:cNvPr id="3" name="Subtitle 2">
-            <a:extLst>
-              <a:ext uri="{FF2B5EF4-FFF2-40B4-BE49-F238E27FC236}">
-                <a16:creationId xmlns:a16="http://schemas.microsoft.com/office/drawing/2014/main" id="{8115A698-1C8E-4A56-8893-4A3FE5F13EFF}"/>
-              </a:ext>
-            </a:extLst>
-          </p:cNvPr>
-          <p:cNvSpPr>
-            <a:spLocks noGrp="1"/>
-          </p:cNvSpPr>
-          <p:nvPr>
-            <p:ph type="subTitle" idx="1"/>
-          </p:nvPr>
-        </p:nvSpPr>
-        <p:spPr/>
-        <p:txBody>
-          <a:bodyPr/>
-          <a:lstStyle/>
-          <a:p>
-            <a:endParaRPr lang="en-IN"/>
+            <a:r>
+              <a:rPr lang="en-IN" b="1" dirty="0">
+                <a:solidFill>
+                  <a:srgbClr val="FF0000"/>
+                </a:solidFill>
+              </a:rPr>
+              <a:t>Easy</a:t>
+            </a:r>
           </a:p>
         </p:txBody>
       </p:sp>
@@ -3412,246 +3422,6 @@
     <p:extLst>
       <p:ext uri="{BB962C8B-B14F-4D97-AF65-F5344CB8AC3E}">
         <p14:creationId xmlns:p14="http://schemas.microsoft.com/office/powerpoint/2010/main" val="471155231"/>
-      </p:ext>
-    </p:extLst>
-  </p:cSld>
-  <p:clrMapOvr>
-    <a:masterClrMapping/>
-  </p:clrMapOvr>
-</p:sld>
-</file>
-
-<file path=ppt/slides/slide10.xml><?xml version="1.0" encoding="utf-8"?>
-<p:sld xmlns:a="http://schemas.openxmlformats.org/drawingml/2006/main" xmlns:r="http://schemas.openxmlformats.org/officeDocument/2006/relationships" xmlns:p="http://schemas.openxmlformats.org/presentationml/2006/main">
-  <p:cSld>
-    <p:spTree>
-      <p:nvGrpSpPr>
-        <p:cNvPr id="1" name=""/>
-        <p:cNvGrpSpPr/>
-        <p:nvPr/>
-      </p:nvGrpSpPr>
-      <p:grpSpPr>
-        <a:xfrm>
-          <a:off x="0" y="0"/>
-          <a:ext cx="0" cy="0"/>
-          <a:chOff x="0" y="0"/>
-          <a:chExt cx="0" cy="0"/>
-        </a:xfrm>
-      </p:grpSpPr>
-    </p:spTree>
-    <p:extLst>
-      <p:ext uri="{BB962C8B-B14F-4D97-AF65-F5344CB8AC3E}">
-        <p14:creationId xmlns:p14="http://schemas.microsoft.com/office/powerpoint/2010/main" val="2470200242"/>
-      </p:ext>
-    </p:extLst>
-  </p:cSld>
-  <p:clrMapOvr>
-    <a:masterClrMapping/>
-  </p:clrMapOvr>
-</p:sld>
-</file>
-
-<file path=ppt/slides/slide11.xml><?xml version="1.0" encoding="utf-8"?>
-<p:sld xmlns:a="http://schemas.openxmlformats.org/drawingml/2006/main" xmlns:r="http://schemas.openxmlformats.org/officeDocument/2006/relationships" xmlns:p="http://schemas.openxmlformats.org/presentationml/2006/main">
-  <p:cSld>
-    <p:spTree>
-      <p:nvGrpSpPr>
-        <p:cNvPr id="1" name=""/>
-        <p:cNvGrpSpPr/>
-        <p:nvPr/>
-      </p:nvGrpSpPr>
-      <p:grpSpPr>
-        <a:xfrm>
-          <a:off x="0" y="0"/>
-          <a:ext cx="0" cy="0"/>
-          <a:chOff x="0" y="0"/>
-          <a:chExt cx="0" cy="0"/>
-        </a:xfrm>
-      </p:grpSpPr>
-    </p:spTree>
-    <p:extLst>
-      <p:ext uri="{BB962C8B-B14F-4D97-AF65-F5344CB8AC3E}">
-        <p14:creationId xmlns:p14="http://schemas.microsoft.com/office/powerpoint/2010/main" val="521274372"/>
-      </p:ext>
-    </p:extLst>
-  </p:cSld>
-  <p:clrMapOvr>
-    <a:masterClrMapping/>
-  </p:clrMapOvr>
-</p:sld>
-</file>
-
-<file path=ppt/slides/slide12.xml><?xml version="1.0" encoding="utf-8"?>
-<p:sld xmlns:a="http://schemas.openxmlformats.org/drawingml/2006/main" xmlns:r="http://schemas.openxmlformats.org/officeDocument/2006/relationships" xmlns:p="http://schemas.openxmlformats.org/presentationml/2006/main">
-  <p:cSld>
-    <p:spTree>
-      <p:nvGrpSpPr>
-        <p:cNvPr id="1" name=""/>
-        <p:cNvGrpSpPr/>
-        <p:nvPr/>
-      </p:nvGrpSpPr>
-      <p:grpSpPr>
-        <a:xfrm>
-          <a:off x="0" y="0"/>
-          <a:ext cx="0" cy="0"/>
-          <a:chOff x="0" y="0"/>
-          <a:chExt cx="0" cy="0"/>
-        </a:xfrm>
-      </p:grpSpPr>
-    </p:spTree>
-    <p:extLst>
-      <p:ext uri="{BB962C8B-B14F-4D97-AF65-F5344CB8AC3E}">
-        <p14:creationId xmlns:p14="http://schemas.microsoft.com/office/powerpoint/2010/main" val="3463904541"/>
-      </p:ext>
-    </p:extLst>
-  </p:cSld>
-  <p:clrMapOvr>
-    <a:masterClrMapping/>
-  </p:clrMapOvr>
-</p:sld>
-</file>
-
-<file path=ppt/slides/slide13.xml><?xml version="1.0" encoding="utf-8"?>
-<p:sld xmlns:a="http://schemas.openxmlformats.org/drawingml/2006/main" xmlns:r="http://schemas.openxmlformats.org/officeDocument/2006/relationships" xmlns:p="http://schemas.openxmlformats.org/presentationml/2006/main">
-  <p:cSld>
-    <p:spTree>
-      <p:nvGrpSpPr>
-        <p:cNvPr id="1" name=""/>
-        <p:cNvGrpSpPr/>
-        <p:nvPr/>
-      </p:nvGrpSpPr>
-      <p:grpSpPr>
-        <a:xfrm>
-          <a:off x="0" y="0"/>
-          <a:ext cx="0" cy="0"/>
-          <a:chOff x="0" y="0"/>
-          <a:chExt cx="0" cy="0"/>
-        </a:xfrm>
-      </p:grpSpPr>
-    </p:spTree>
-    <p:extLst>
-      <p:ext uri="{BB962C8B-B14F-4D97-AF65-F5344CB8AC3E}">
-        <p14:creationId xmlns:p14="http://schemas.microsoft.com/office/powerpoint/2010/main" val="369495696"/>
-      </p:ext>
-    </p:extLst>
-  </p:cSld>
-  <p:clrMapOvr>
-    <a:masterClrMapping/>
-  </p:clrMapOvr>
-</p:sld>
-</file>
-
-<file path=ppt/slides/slide14.xml><?xml version="1.0" encoding="utf-8"?>
-<p:sld xmlns:a="http://schemas.openxmlformats.org/drawingml/2006/main" xmlns:r="http://schemas.openxmlformats.org/officeDocument/2006/relationships" xmlns:p="http://schemas.openxmlformats.org/presentationml/2006/main">
-  <p:cSld>
-    <p:spTree>
-      <p:nvGrpSpPr>
-        <p:cNvPr id="1" name=""/>
-        <p:cNvGrpSpPr/>
-        <p:nvPr/>
-      </p:nvGrpSpPr>
-      <p:grpSpPr>
-        <a:xfrm>
-          <a:off x="0" y="0"/>
-          <a:ext cx="0" cy="0"/>
-          <a:chOff x="0" y="0"/>
-          <a:chExt cx="0" cy="0"/>
-        </a:xfrm>
-      </p:grpSpPr>
-    </p:spTree>
-    <p:extLst>
-      <p:ext uri="{BB962C8B-B14F-4D97-AF65-F5344CB8AC3E}">
-        <p14:creationId xmlns:p14="http://schemas.microsoft.com/office/powerpoint/2010/main" val="1619908568"/>
-      </p:ext>
-    </p:extLst>
-  </p:cSld>
-  <p:clrMapOvr>
-    <a:masterClrMapping/>
-  </p:clrMapOvr>
-</p:sld>
-</file>
-
-<file path=ppt/slides/slide15.xml><?xml version="1.0" encoding="utf-8"?>
-<p:sld xmlns:a="http://schemas.openxmlformats.org/drawingml/2006/main" xmlns:r="http://schemas.openxmlformats.org/officeDocument/2006/relationships" xmlns:p="http://schemas.openxmlformats.org/presentationml/2006/main">
-  <p:cSld>
-    <p:spTree>
-      <p:nvGrpSpPr>
-        <p:cNvPr id="1" name=""/>
-        <p:cNvGrpSpPr/>
-        <p:nvPr/>
-      </p:nvGrpSpPr>
-      <p:grpSpPr>
-        <a:xfrm>
-          <a:off x="0" y="0"/>
-          <a:ext cx="0" cy="0"/>
-          <a:chOff x="0" y="0"/>
-          <a:chExt cx="0" cy="0"/>
-        </a:xfrm>
-      </p:grpSpPr>
-    </p:spTree>
-    <p:extLst>
-      <p:ext uri="{BB962C8B-B14F-4D97-AF65-F5344CB8AC3E}">
-        <p14:creationId xmlns:p14="http://schemas.microsoft.com/office/powerpoint/2010/main" val="866340706"/>
-      </p:ext>
-    </p:extLst>
-  </p:cSld>
-  <p:clrMapOvr>
-    <a:masterClrMapping/>
-  </p:clrMapOvr>
-</p:sld>
-</file>
-
-<file path=ppt/slides/slide16.xml><?xml version="1.0" encoding="utf-8"?>
-<p:sld xmlns:a="http://schemas.openxmlformats.org/drawingml/2006/main" xmlns:r="http://schemas.openxmlformats.org/officeDocument/2006/relationships" xmlns:p="http://schemas.openxmlformats.org/presentationml/2006/main">
-  <p:cSld>
-    <p:spTree>
-      <p:nvGrpSpPr>
-        <p:cNvPr id="1" name=""/>
-        <p:cNvGrpSpPr/>
-        <p:nvPr/>
-      </p:nvGrpSpPr>
-      <p:grpSpPr>
-        <a:xfrm>
-          <a:off x="0" y="0"/>
-          <a:ext cx="0" cy="0"/>
-          <a:chOff x="0" y="0"/>
-          <a:chExt cx="0" cy="0"/>
-        </a:xfrm>
-      </p:grpSpPr>
-    </p:spTree>
-    <p:extLst>
-      <p:ext uri="{BB962C8B-B14F-4D97-AF65-F5344CB8AC3E}">
-        <p14:creationId xmlns:p14="http://schemas.microsoft.com/office/powerpoint/2010/main" val="2670694094"/>
-      </p:ext>
-    </p:extLst>
-  </p:cSld>
-  <p:clrMapOvr>
-    <a:masterClrMapping/>
-  </p:clrMapOvr>
-</p:sld>
-</file>
-
-<file path=ppt/slides/slide17.xml><?xml version="1.0" encoding="utf-8"?>
-<p:sld xmlns:a="http://schemas.openxmlformats.org/drawingml/2006/main" xmlns:r="http://schemas.openxmlformats.org/officeDocument/2006/relationships" xmlns:p="http://schemas.openxmlformats.org/presentationml/2006/main">
-  <p:cSld>
-    <p:spTree>
-      <p:nvGrpSpPr>
-        <p:cNvPr id="1" name=""/>
-        <p:cNvGrpSpPr/>
-        <p:nvPr/>
-      </p:nvGrpSpPr>
-      <p:grpSpPr>
-        <a:xfrm>
-          <a:off x="0" y="0"/>
-          <a:ext cx="0" cy="0"/>
-          <a:chOff x="0" y="0"/>
-          <a:chExt cx="0" cy="0"/>
-        </a:xfrm>
-      </p:grpSpPr>
-    </p:spTree>
-    <p:extLst>
-      <p:ext uri="{BB962C8B-B14F-4D97-AF65-F5344CB8AC3E}">
-        <p14:creationId xmlns:p14="http://schemas.microsoft.com/office/powerpoint/2010/main" val="85515496"/>
       </p:ext>
     </p:extLst>
   </p:cSld>
@@ -3678,6 +3448,36 @@
           <a:chExt cx="0" cy="0"/>
         </a:xfrm>
       </p:grpSpPr>
+      <p:pic>
+        <p:nvPicPr>
+          <p:cNvPr id="3" name="Picture 2">
+            <a:extLst>
+              <a:ext uri="{FF2B5EF4-FFF2-40B4-BE49-F238E27FC236}">
+                <a16:creationId xmlns:a16="http://schemas.microsoft.com/office/drawing/2014/main" id="{13C35DE7-0EB6-411B-848B-D001862571B2}"/>
+              </a:ext>
+            </a:extLst>
+          </p:cNvPr>
+          <p:cNvPicPr>
+            <a:picLocks noChangeAspect="1"/>
+          </p:cNvPicPr>
+          <p:nvPr/>
+        </p:nvPicPr>
+        <p:blipFill>
+          <a:blip r:embed="rId2"/>
+          <a:stretch>
+            <a:fillRect/>
+          </a:stretch>
+        </p:blipFill>
+        <p:spPr>
+          <a:xfrm>
+            <a:off x="0" y="0"/>
+            <a:ext cx="12192000" cy="6858000"/>
+          </a:xfrm>
+          <a:prstGeom prst="rect">
+            <a:avLst/>
+          </a:prstGeom>
+        </p:spPr>
+      </p:pic>
     </p:spTree>
     <p:extLst>
       <p:ext uri="{BB962C8B-B14F-4D97-AF65-F5344CB8AC3E}">
@@ -3708,6 +3508,36 @@
           <a:chExt cx="0" cy="0"/>
         </a:xfrm>
       </p:grpSpPr>
+      <p:pic>
+        <p:nvPicPr>
+          <p:cNvPr id="3" name="Picture 2">
+            <a:extLst>
+              <a:ext uri="{FF2B5EF4-FFF2-40B4-BE49-F238E27FC236}">
+                <a16:creationId xmlns:a16="http://schemas.microsoft.com/office/drawing/2014/main" id="{5B1623F2-5695-439B-BA1C-30FBBE052D37}"/>
+              </a:ext>
+            </a:extLst>
+          </p:cNvPr>
+          <p:cNvPicPr>
+            <a:picLocks noChangeAspect="1"/>
+          </p:cNvPicPr>
+          <p:nvPr/>
+        </p:nvPicPr>
+        <p:blipFill>
+          <a:blip r:embed="rId2"/>
+          <a:stretch>
+            <a:fillRect/>
+          </a:stretch>
+        </p:blipFill>
+        <p:spPr>
+          <a:xfrm>
+            <a:off x="0" y="0"/>
+            <a:ext cx="12192000" cy="6858000"/>
+          </a:xfrm>
+          <a:prstGeom prst="rect">
+            <a:avLst/>
+          </a:prstGeom>
+        </p:spPr>
+      </p:pic>
     </p:spTree>
     <p:extLst>
       <p:ext uri="{BB962C8B-B14F-4D97-AF65-F5344CB8AC3E}">
@@ -3738,6 +3568,106 @@
           <a:chExt cx="0" cy="0"/>
         </a:xfrm>
       </p:grpSpPr>
+      <p:pic>
+        <p:nvPicPr>
+          <p:cNvPr id="3" name="Picture 2">
+            <a:extLst>
+              <a:ext uri="{FF2B5EF4-FFF2-40B4-BE49-F238E27FC236}">
+                <a16:creationId xmlns:a16="http://schemas.microsoft.com/office/drawing/2014/main" id="{7023DA7F-5315-49AE-B738-0FB3BBBBA3AD}"/>
+              </a:ext>
+            </a:extLst>
+          </p:cNvPr>
+          <p:cNvPicPr>
+            <a:picLocks noChangeAspect="1"/>
+          </p:cNvPicPr>
+          <p:nvPr/>
+        </p:nvPicPr>
+        <p:blipFill>
+          <a:blip r:embed="rId2"/>
+          <a:stretch>
+            <a:fillRect/>
+          </a:stretch>
+        </p:blipFill>
+        <p:spPr>
+          <a:xfrm>
+            <a:off x="0" y="0"/>
+            <a:ext cx="12192000" cy="6858000"/>
+          </a:xfrm>
+          <a:prstGeom prst="rect">
+            <a:avLst/>
+          </a:prstGeom>
+        </p:spPr>
+      </p:pic>
+      <p:pic>
+        <p:nvPicPr>
+          <p:cNvPr id="5" name="Picture 4">
+            <a:extLst>
+              <a:ext uri="{FF2B5EF4-FFF2-40B4-BE49-F238E27FC236}">
+                <a16:creationId xmlns:a16="http://schemas.microsoft.com/office/drawing/2014/main" id="{323F690B-447C-405E-8952-53A193689A81}"/>
+              </a:ext>
+            </a:extLst>
+          </p:cNvPr>
+          <p:cNvPicPr>
+            <a:picLocks noChangeAspect="1"/>
+          </p:cNvPicPr>
+          <p:nvPr/>
+        </p:nvPicPr>
+        <p:blipFill>
+          <a:blip r:embed="rId3"/>
+          <a:stretch>
+            <a:fillRect/>
+          </a:stretch>
+        </p:blipFill>
+        <p:spPr>
+          <a:xfrm>
+            <a:off x="6096000" y="5454147"/>
+            <a:ext cx="6044159" cy="757376"/>
+          </a:xfrm>
+          <a:prstGeom prst="rect">
+            <a:avLst/>
+          </a:prstGeom>
+        </p:spPr>
+      </p:pic>
+      <p:sp>
+        <p:nvSpPr>
+          <p:cNvPr id="7" name="TextBox 6">
+            <a:extLst>
+              <a:ext uri="{FF2B5EF4-FFF2-40B4-BE49-F238E27FC236}">
+                <a16:creationId xmlns:a16="http://schemas.microsoft.com/office/drawing/2014/main" id="{C53316FF-5B6F-4C5B-92E8-5182B3F07130}"/>
+              </a:ext>
+            </a:extLst>
+          </p:cNvPr>
+          <p:cNvSpPr txBox="1"/>
+          <p:nvPr/>
+        </p:nvSpPr>
+        <p:spPr>
+          <a:xfrm>
+            <a:off x="4960856" y="5540447"/>
+            <a:ext cx="1817016" cy="584775"/>
+          </a:xfrm>
+          <a:prstGeom prst="rect">
+            <a:avLst/>
+          </a:prstGeom>
+          <a:noFill/>
+        </p:spPr>
+        <p:txBody>
+          <a:bodyPr wrap="square">
+            <a:spAutoFit/>
+          </a:bodyPr>
+          <a:lstStyle/>
+          <a:p>
+            <a:r>
+              <a:rPr lang="en-IN" sz="3200" b="1" dirty="0">
+                <a:solidFill>
+                  <a:srgbClr val="FF0000"/>
+                </a:solidFill>
+              </a:rPr>
+              <a:t>Note</a:t>
+            </a:r>
+            <a:endParaRPr lang="en-IN" sz="3200" dirty="0"/>
+          </a:p>
+        </p:txBody>
+      </p:sp>
     </p:spTree>
     <p:extLst>
       <p:ext uri="{BB962C8B-B14F-4D97-AF65-F5344CB8AC3E}">
@@ -3768,6 +3698,36 @@
           <a:chExt cx="0" cy="0"/>
         </a:xfrm>
       </p:grpSpPr>
+      <p:pic>
+        <p:nvPicPr>
+          <p:cNvPr id="3" name="Picture 2">
+            <a:extLst>
+              <a:ext uri="{FF2B5EF4-FFF2-40B4-BE49-F238E27FC236}">
+                <a16:creationId xmlns:a16="http://schemas.microsoft.com/office/drawing/2014/main" id="{D3343C68-25FD-4937-9980-95B2CA674C06}"/>
+              </a:ext>
+            </a:extLst>
+          </p:cNvPr>
+          <p:cNvPicPr>
+            <a:picLocks noChangeAspect="1"/>
+          </p:cNvPicPr>
+          <p:nvPr/>
+        </p:nvPicPr>
+        <p:blipFill>
+          <a:blip r:embed="rId2"/>
+          <a:stretch>
+            <a:fillRect/>
+          </a:stretch>
+        </p:blipFill>
+        <p:spPr>
+          <a:xfrm>
+            <a:off x="0" y="0"/>
+            <a:ext cx="12192000" cy="6858000"/>
+          </a:xfrm>
+          <a:prstGeom prst="rect">
+            <a:avLst/>
+          </a:prstGeom>
+        </p:spPr>
+      </p:pic>
     </p:spTree>
     <p:extLst>
       <p:ext uri="{BB962C8B-B14F-4D97-AF65-F5344CB8AC3E}">
@@ -3798,100 +3758,40 @@
           <a:chExt cx="0" cy="0"/>
         </a:xfrm>
       </p:grpSpPr>
+      <p:pic>
+        <p:nvPicPr>
+          <p:cNvPr id="3" name="Picture 2">
+            <a:extLst>
+              <a:ext uri="{FF2B5EF4-FFF2-40B4-BE49-F238E27FC236}">
+                <a16:creationId xmlns:a16="http://schemas.microsoft.com/office/drawing/2014/main" id="{DF8A4B8C-80AC-4358-8983-44BAA5A2333C}"/>
+              </a:ext>
+            </a:extLst>
+          </p:cNvPr>
+          <p:cNvPicPr>
+            <a:picLocks noChangeAspect="1"/>
+          </p:cNvPicPr>
+          <p:nvPr/>
+        </p:nvPicPr>
+        <p:blipFill>
+          <a:blip r:embed="rId2"/>
+          <a:stretch>
+            <a:fillRect/>
+          </a:stretch>
+        </p:blipFill>
+        <p:spPr>
+          <a:xfrm>
+            <a:off x="0" y="0"/>
+            <a:ext cx="12192000" cy="6858000"/>
+          </a:xfrm>
+          <a:prstGeom prst="rect">
+            <a:avLst/>
+          </a:prstGeom>
+        </p:spPr>
+      </p:pic>
     </p:spTree>
     <p:extLst>
       <p:ext uri="{BB962C8B-B14F-4D97-AF65-F5344CB8AC3E}">
         <p14:creationId xmlns:p14="http://schemas.microsoft.com/office/powerpoint/2010/main" val="4103904489"/>
-      </p:ext>
-    </p:extLst>
-  </p:cSld>
-  <p:clrMapOvr>
-    <a:masterClrMapping/>
-  </p:clrMapOvr>
-</p:sld>
-</file>
-
-<file path=ppt/slides/slide7.xml><?xml version="1.0" encoding="utf-8"?>
-<p:sld xmlns:a="http://schemas.openxmlformats.org/drawingml/2006/main" xmlns:r="http://schemas.openxmlformats.org/officeDocument/2006/relationships" xmlns:p="http://schemas.openxmlformats.org/presentationml/2006/main">
-  <p:cSld>
-    <p:spTree>
-      <p:nvGrpSpPr>
-        <p:cNvPr id="1" name=""/>
-        <p:cNvGrpSpPr/>
-        <p:nvPr/>
-      </p:nvGrpSpPr>
-      <p:grpSpPr>
-        <a:xfrm>
-          <a:off x="0" y="0"/>
-          <a:ext cx="0" cy="0"/>
-          <a:chOff x="0" y="0"/>
-          <a:chExt cx="0" cy="0"/>
-        </a:xfrm>
-      </p:grpSpPr>
-    </p:spTree>
-    <p:extLst>
-      <p:ext uri="{BB962C8B-B14F-4D97-AF65-F5344CB8AC3E}">
-        <p14:creationId xmlns:p14="http://schemas.microsoft.com/office/powerpoint/2010/main" val="2964768536"/>
-      </p:ext>
-    </p:extLst>
-  </p:cSld>
-  <p:clrMapOvr>
-    <a:masterClrMapping/>
-  </p:clrMapOvr>
-</p:sld>
-</file>
-
-<file path=ppt/slides/slide8.xml><?xml version="1.0" encoding="utf-8"?>
-<p:sld xmlns:a="http://schemas.openxmlformats.org/drawingml/2006/main" xmlns:r="http://schemas.openxmlformats.org/officeDocument/2006/relationships" xmlns:p="http://schemas.openxmlformats.org/presentationml/2006/main">
-  <p:cSld>
-    <p:spTree>
-      <p:nvGrpSpPr>
-        <p:cNvPr id="1" name=""/>
-        <p:cNvGrpSpPr/>
-        <p:nvPr/>
-      </p:nvGrpSpPr>
-      <p:grpSpPr>
-        <a:xfrm>
-          <a:off x="0" y="0"/>
-          <a:ext cx="0" cy="0"/>
-          <a:chOff x="0" y="0"/>
-          <a:chExt cx="0" cy="0"/>
-        </a:xfrm>
-      </p:grpSpPr>
-    </p:spTree>
-    <p:extLst>
-      <p:ext uri="{BB962C8B-B14F-4D97-AF65-F5344CB8AC3E}">
-        <p14:creationId xmlns:p14="http://schemas.microsoft.com/office/powerpoint/2010/main" val="4015412315"/>
-      </p:ext>
-    </p:extLst>
-  </p:cSld>
-  <p:clrMapOvr>
-    <a:masterClrMapping/>
-  </p:clrMapOvr>
-</p:sld>
-</file>
-
-<file path=ppt/slides/slide9.xml><?xml version="1.0" encoding="utf-8"?>
-<p:sld xmlns:a="http://schemas.openxmlformats.org/drawingml/2006/main" xmlns:r="http://schemas.openxmlformats.org/officeDocument/2006/relationships" xmlns:p="http://schemas.openxmlformats.org/presentationml/2006/main">
-  <p:cSld>
-    <p:spTree>
-      <p:nvGrpSpPr>
-        <p:cNvPr id="1" name=""/>
-        <p:cNvGrpSpPr/>
-        <p:nvPr/>
-      </p:nvGrpSpPr>
-      <p:grpSpPr>
-        <a:xfrm>
-          <a:off x="0" y="0"/>
-          <a:ext cx="0" cy="0"/>
-          <a:chOff x="0" y="0"/>
-          <a:chExt cx="0" cy="0"/>
-        </a:xfrm>
-      </p:grpSpPr>
-    </p:spTree>
-    <p:extLst>
-      <p:ext uri="{BB962C8B-B14F-4D97-AF65-F5344CB8AC3E}">
-        <p14:creationId xmlns:p14="http://schemas.microsoft.com/office/powerpoint/2010/main" val="4169226824"/>
       </p:ext>
     </p:extLst>
   </p:cSld>

</xml_diff>

<commit_message>
DSA on Arrays, TOC
</commit_message>
<xml_diff>
--- a/DSA/Stiver DSA/3. Solve problems on Arrays/Easy.pptx
+++ b/DSA/Stiver DSA/3. Solve problems on Arrays/Easy.pptx
@@ -11,6 +11,8 @@
     <p:sldId id="259" r:id="rId5"/>
     <p:sldId id="260" r:id="rId6"/>
     <p:sldId id="261" r:id="rId7"/>
+    <p:sldId id="262" r:id="rId8"/>
+    <p:sldId id="263" r:id="rId9"/>
   </p:sldIdLst>
   <p:sldSz cx="12192000" cy="6858000"/>
   <p:notesSz cx="6858000" cy="9144000"/>
@@ -142,6 +144,12 @@
             <p14:sldId id="261"/>
           </p14:sldIdLst>
         </p14:section>
+        <p14:section name="LCM 189 : Rotate Array" id="{E753F407-EBDC-49AB-8DFA-4EF319CF768D}">
+          <p14:sldIdLst>
+            <p14:sldId id="262"/>
+            <p14:sldId id="263"/>
+          </p14:sldIdLst>
+        </p14:section>
       </p14:sectionLst>
     </p:ext>
     <p:ext uri="{EFAFB233-063F-42B5-8137-9DF3F51BA10A}">
@@ -300,7 +308,7 @@
           <a:p>
             <a:fld id="{9379514C-029E-4DD5-94A2-F59381012869}" type="datetimeFigureOut">
               <a:rPr lang="en-IN" smtClean="0"/>
-              <a:t>17-01-2026</a:t>
+              <a:t>18-01-2026</a:t>
             </a:fld>
             <a:endParaRPr lang="en-IN"/>
           </a:p>
@@ -500,7 +508,7 @@
           <a:p>
             <a:fld id="{9379514C-029E-4DD5-94A2-F59381012869}" type="datetimeFigureOut">
               <a:rPr lang="en-IN" smtClean="0"/>
-              <a:t>17-01-2026</a:t>
+              <a:t>18-01-2026</a:t>
             </a:fld>
             <a:endParaRPr lang="en-IN"/>
           </a:p>
@@ -710,7 +718,7 @@
           <a:p>
             <a:fld id="{9379514C-029E-4DD5-94A2-F59381012869}" type="datetimeFigureOut">
               <a:rPr lang="en-IN" smtClean="0"/>
-              <a:t>17-01-2026</a:t>
+              <a:t>18-01-2026</a:t>
             </a:fld>
             <a:endParaRPr lang="en-IN"/>
           </a:p>
@@ -910,7 +918,7 @@
           <a:p>
             <a:fld id="{9379514C-029E-4DD5-94A2-F59381012869}" type="datetimeFigureOut">
               <a:rPr lang="en-IN" smtClean="0"/>
-              <a:t>17-01-2026</a:t>
+              <a:t>18-01-2026</a:t>
             </a:fld>
             <a:endParaRPr lang="en-IN"/>
           </a:p>
@@ -1186,7 +1194,7 @@
           <a:p>
             <a:fld id="{9379514C-029E-4DD5-94A2-F59381012869}" type="datetimeFigureOut">
               <a:rPr lang="en-IN" smtClean="0"/>
-              <a:t>17-01-2026</a:t>
+              <a:t>18-01-2026</a:t>
             </a:fld>
             <a:endParaRPr lang="en-IN"/>
           </a:p>
@@ -1454,7 +1462,7 @@
           <a:p>
             <a:fld id="{9379514C-029E-4DD5-94A2-F59381012869}" type="datetimeFigureOut">
               <a:rPr lang="en-IN" smtClean="0"/>
-              <a:t>17-01-2026</a:t>
+              <a:t>18-01-2026</a:t>
             </a:fld>
             <a:endParaRPr lang="en-IN"/>
           </a:p>
@@ -1869,7 +1877,7 @@
           <a:p>
             <a:fld id="{9379514C-029E-4DD5-94A2-F59381012869}" type="datetimeFigureOut">
               <a:rPr lang="en-IN" smtClean="0"/>
-              <a:t>17-01-2026</a:t>
+              <a:t>18-01-2026</a:t>
             </a:fld>
             <a:endParaRPr lang="en-IN"/>
           </a:p>
@@ -2011,7 +2019,7 @@
           <a:p>
             <a:fld id="{9379514C-029E-4DD5-94A2-F59381012869}" type="datetimeFigureOut">
               <a:rPr lang="en-IN" smtClean="0"/>
-              <a:t>17-01-2026</a:t>
+              <a:t>18-01-2026</a:t>
             </a:fld>
             <a:endParaRPr lang="en-IN"/>
           </a:p>
@@ -2124,7 +2132,7 @@
           <a:p>
             <a:fld id="{9379514C-029E-4DD5-94A2-F59381012869}" type="datetimeFigureOut">
               <a:rPr lang="en-IN" smtClean="0"/>
-              <a:t>17-01-2026</a:t>
+              <a:t>18-01-2026</a:t>
             </a:fld>
             <a:endParaRPr lang="en-IN"/>
           </a:p>
@@ -2437,7 +2445,7 @@
           <a:p>
             <a:fld id="{9379514C-029E-4DD5-94A2-F59381012869}" type="datetimeFigureOut">
               <a:rPr lang="en-IN" smtClean="0"/>
-              <a:t>17-01-2026</a:t>
+              <a:t>18-01-2026</a:t>
             </a:fld>
             <a:endParaRPr lang="en-IN"/>
           </a:p>
@@ -2726,7 +2734,7 @@
           <a:p>
             <a:fld id="{9379514C-029E-4DD5-94A2-F59381012869}" type="datetimeFigureOut">
               <a:rPr lang="en-IN" smtClean="0"/>
-              <a:t>17-01-2026</a:t>
+              <a:t>18-01-2026</a:t>
             </a:fld>
             <a:endParaRPr lang="en-IN"/>
           </a:p>
@@ -2969,7 +2977,7 @@
           <a:p>
             <a:fld id="{9379514C-029E-4DD5-94A2-F59381012869}" type="datetimeFigureOut">
               <a:rPr lang="en-IN" smtClean="0"/>
-              <a:t>17-01-2026</a:t>
+              <a:t>18-01-2026</a:t>
             </a:fld>
             <a:endParaRPr lang="en-IN"/>
           </a:p>
@@ -3801,6 +3809,126 @@
 </p:sld>
 </file>
 
+<file path=ppt/slides/slide7.xml><?xml version="1.0" encoding="utf-8"?>
+<p:sld xmlns:a="http://schemas.openxmlformats.org/drawingml/2006/main" xmlns:r="http://schemas.openxmlformats.org/officeDocument/2006/relationships" xmlns:p="http://schemas.openxmlformats.org/presentationml/2006/main">
+  <p:cSld>
+    <p:spTree>
+      <p:nvGrpSpPr>
+        <p:cNvPr id="1" name=""/>
+        <p:cNvGrpSpPr/>
+        <p:nvPr/>
+      </p:nvGrpSpPr>
+      <p:grpSpPr>
+        <a:xfrm>
+          <a:off x="0" y="0"/>
+          <a:ext cx="0" cy="0"/>
+          <a:chOff x="0" y="0"/>
+          <a:chExt cx="0" cy="0"/>
+        </a:xfrm>
+      </p:grpSpPr>
+      <p:pic>
+        <p:nvPicPr>
+          <p:cNvPr id="3" name="Picture 2">
+            <a:extLst>
+              <a:ext uri="{FF2B5EF4-FFF2-40B4-BE49-F238E27FC236}">
+                <a16:creationId xmlns:a16="http://schemas.microsoft.com/office/drawing/2014/main" id="{755725C7-10A5-442C-B34B-B4DF864D750E}"/>
+              </a:ext>
+            </a:extLst>
+          </p:cNvPr>
+          <p:cNvPicPr>
+            <a:picLocks noChangeAspect="1"/>
+          </p:cNvPicPr>
+          <p:nvPr/>
+        </p:nvPicPr>
+        <p:blipFill>
+          <a:blip r:embed="rId2"/>
+          <a:stretch>
+            <a:fillRect/>
+          </a:stretch>
+        </p:blipFill>
+        <p:spPr>
+          <a:xfrm>
+            <a:off x="0" y="0"/>
+            <a:ext cx="12192000" cy="6858000"/>
+          </a:xfrm>
+          <a:prstGeom prst="rect">
+            <a:avLst/>
+          </a:prstGeom>
+        </p:spPr>
+      </p:pic>
+      <p:pic>
+        <p:nvPicPr>
+          <p:cNvPr id="5" name="Picture 4">
+            <a:extLst>
+              <a:ext uri="{FF2B5EF4-FFF2-40B4-BE49-F238E27FC236}">
+                <a16:creationId xmlns:a16="http://schemas.microsoft.com/office/drawing/2014/main" id="{E7578D7F-E89E-47BB-B670-94578DA5A70A}"/>
+              </a:ext>
+            </a:extLst>
+          </p:cNvPr>
+          <p:cNvPicPr>
+            <a:picLocks noChangeAspect="1"/>
+          </p:cNvPicPr>
+          <p:nvPr/>
+        </p:nvPicPr>
+        <p:blipFill>
+          <a:blip r:embed="rId3"/>
+          <a:stretch>
+            <a:fillRect/>
+          </a:stretch>
+        </p:blipFill>
+        <p:spPr>
+          <a:xfrm>
+            <a:off x="7205060" y="3688344"/>
+            <a:ext cx="4116693" cy="2365915"/>
+          </a:xfrm>
+          <a:prstGeom prst="rect">
+            <a:avLst/>
+          </a:prstGeom>
+        </p:spPr>
+      </p:pic>
+    </p:spTree>
+    <p:extLst>
+      <p:ext uri="{BB962C8B-B14F-4D97-AF65-F5344CB8AC3E}">
+        <p14:creationId xmlns:p14="http://schemas.microsoft.com/office/powerpoint/2010/main" val="1124353813"/>
+      </p:ext>
+    </p:extLst>
+  </p:cSld>
+  <p:clrMapOvr>
+    <a:masterClrMapping/>
+  </p:clrMapOvr>
+</p:sld>
+</file>
+
+<file path=ppt/slides/slide8.xml><?xml version="1.0" encoding="utf-8"?>
+<p:sld xmlns:a="http://schemas.openxmlformats.org/drawingml/2006/main" xmlns:r="http://schemas.openxmlformats.org/officeDocument/2006/relationships" xmlns:p="http://schemas.openxmlformats.org/presentationml/2006/main">
+  <p:cSld>
+    <p:spTree>
+      <p:nvGrpSpPr>
+        <p:cNvPr id="1" name=""/>
+        <p:cNvGrpSpPr/>
+        <p:nvPr/>
+      </p:nvGrpSpPr>
+      <p:grpSpPr>
+        <a:xfrm>
+          <a:off x="0" y="0"/>
+          <a:ext cx="0" cy="0"/>
+          <a:chOff x="0" y="0"/>
+          <a:chExt cx="0" cy="0"/>
+        </a:xfrm>
+      </p:grpSpPr>
+    </p:spTree>
+    <p:extLst>
+      <p:ext uri="{BB962C8B-B14F-4D97-AF65-F5344CB8AC3E}">
+        <p14:creationId xmlns:p14="http://schemas.microsoft.com/office/powerpoint/2010/main" val="1411405786"/>
+      </p:ext>
+    </p:extLst>
+  </p:cSld>
+  <p:clrMapOvr>
+    <a:masterClrMapping/>
+  </p:clrMapOvr>
+</p:sld>
+</file>
+
 <file path=ppt/theme/theme1.xml><?xml version="1.0" encoding="utf-8"?>
 <a:theme xmlns:a="http://schemas.openxmlformats.org/drawingml/2006/main" name="Office Theme">
   <a:themeElements>

</xml_diff>

<commit_message>
HashMap, Arrays 4 Problems of Leetcode
</commit_message>
<xml_diff>
--- a/DSA/Stiver DSA/3. Solve problems on Arrays/Easy.pptx
+++ b/DSA/Stiver DSA/3. Solve problems on Arrays/Easy.pptx
@@ -308,7 +308,7 @@
           <a:p>
             <a:fld id="{9379514C-029E-4DD5-94A2-F59381012869}" type="datetimeFigureOut">
               <a:rPr lang="en-IN" smtClean="0"/>
-              <a:t>18-01-2026</a:t>
+              <a:t>20-01-2026</a:t>
             </a:fld>
             <a:endParaRPr lang="en-IN"/>
           </a:p>
@@ -508,7 +508,7 @@
           <a:p>
             <a:fld id="{9379514C-029E-4DD5-94A2-F59381012869}" type="datetimeFigureOut">
               <a:rPr lang="en-IN" smtClean="0"/>
-              <a:t>18-01-2026</a:t>
+              <a:t>20-01-2026</a:t>
             </a:fld>
             <a:endParaRPr lang="en-IN"/>
           </a:p>
@@ -718,7 +718,7 @@
           <a:p>
             <a:fld id="{9379514C-029E-4DD5-94A2-F59381012869}" type="datetimeFigureOut">
               <a:rPr lang="en-IN" smtClean="0"/>
-              <a:t>18-01-2026</a:t>
+              <a:t>20-01-2026</a:t>
             </a:fld>
             <a:endParaRPr lang="en-IN"/>
           </a:p>
@@ -918,7 +918,7 @@
           <a:p>
             <a:fld id="{9379514C-029E-4DD5-94A2-F59381012869}" type="datetimeFigureOut">
               <a:rPr lang="en-IN" smtClean="0"/>
-              <a:t>18-01-2026</a:t>
+              <a:t>20-01-2026</a:t>
             </a:fld>
             <a:endParaRPr lang="en-IN"/>
           </a:p>
@@ -1194,7 +1194,7 @@
           <a:p>
             <a:fld id="{9379514C-029E-4DD5-94A2-F59381012869}" type="datetimeFigureOut">
               <a:rPr lang="en-IN" smtClean="0"/>
-              <a:t>18-01-2026</a:t>
+              <a:t>20-01-2026</a:t>
             </a:fld>
             <a:endParaRPr lang="en-IN"/>
           </a:p>
@@ -1462,7 +1462,7 @@
           <a:p>
             <a:fld id="{9379514C-029E-4DD5-94A2-F59381012869}" type="datetimeFigureOut">
               <a:rPr lang="en-IN" smtClean="0"/>
-              <a:t>18-01-2026</a:t>
+              <a:t>20-01-2026</a:t>
             </a:fld>
             <a:endParaRPr lang="en-IN"/>
           </a:p>
@@ -1877,7 +1877,7 @@
           <a:p>
             <a:fld id="{9379514C-029E-4DD5-94A2-F59381012869}" type="datetimeFigureOut">
               <a:rPr lang="en-IN" smtClean="0"/>
-              <a:t>18-01-2026</a:t>
+              <a:t>20-01-2026</a:t>
             </a:fld>
             <a:endParaRPr lang="en-IN"/>
           </a:p>
@@ -2019,7 +2019,7 @@
           <a:p>
             <a:fld id="{9379514C-029E-4DD5-94A2-F59381012869}" type="datetimeFigureOut">
               <a:rPr lang="en-IN" smtClean="0"/>
-              <a:t>18-01-2026</a:t>
+              <a:t>20-01-2026</a:t>
             </a:fld>
             <a:endParaRPr lang="en-IN"/>
           </a:p>
@@ -2132,7 +2132,7 @@
           <a:p>
             <a:fld id="{9379514C-029E-4DD5-94A2-F59381012869}" type="datetimeFigureOut">
               <a:rPr lang="en-IN" smtClean="0"/>
-              <a:t>18-01-2026</a:t>
+              <a:t>20-01-2026</a:t>
             </a:fld>
             <a:endParaRPr lang="en-IN"/>
           </a:p>
@@ -2445,7 +2445,7 @@
           <a:p>
             <a:fld id="{9379514C-029E-4DD5-94A2-F59381012869}" type="datetimeFigureOut">
               <a:rPr lang="en-IN" smtClean="0"/>
-              <a:t>18-01-2026</a:t>
+              <a:t>20-01-2026</a:t>
             </a:fld>
             <a:endParaRPr lang="en-IN"/>
           </a:p>
@@ -2734,7 +2734,7 @@
           <a:p>
             <a:fld id="{9379514C-029E-4DD5-94A2-F59381012869}" type="datetimeFigureOut">
               <a:rPr lang="en-IN" smtClean="0"/>
-              <a:t>18-01-2026</a:t>
+              <a:t>20-01-2026</a:t>
             </a:fld>
             <a:endParaRPr lang="en-IN"/>
           </a:p>
@@ -2977,7 +2977,7 @@
           <a:p>
             <a:fld id="{9379514C-029E-4DD5-94A2-F59381012869}" type="datetimeFigureOut">
               <a:rPr lang="en-IN" smtClean="0"/>
-              <a:t>18-01-2026</a:t>
+              <a:t>20-01-2026</a:t>
             </a:fld>
             <a:endParaRPr lang="en-IN"/>
           </a:p>

</xml_diff>